<commit_message>
Updated for 1/13/2021 presentation
</commit_message>
<xml_diff>
--- a/The Unix Philosophy - Attributed - 2021-01-13.pptx
+++ b/The Unix Philosophy - Attributed - 2021-01-13.pptx
@@ -212,7 +212,7 @@
           <a:p>
             <a:fld id="{A5F5E26E-66A7-4B62-B7F0-7F248595D5F5}" type="datetimeFigureOut">
               <a:rPr lang="en-US" smtClean="0"/>
-              <a:t>12/7/2020</a:t>
+              <a:t>1/13/2021</a:t>
             </a:fld>
             <a:endParaRPr lang="en-US"/>
           </a:p>
@@ -2746,7 +2746,7 @@
             <a:fld id="{B61BEF0D-F0BB-DE4B-95CE-6DB70DBA9567}" type="datetimeFigureOut">
               <a:rPr lang="en-US" dirty="0"/>
               <a:pPr/>
-              <a:t>12/7/2020</a:t>
+              <a:t>1/13/2021</a:t>
             </a:fld>
             <a:endParaRPr lang="en-US" dirty="0"/>
           </a:p>
@@ -2994,7 +2994,7 @@
             <a:fld id="{B61BEF0D-F0BB-DE4B-95CE-6DB70DBA9567}" type="datetimeFigureOut">
               <a:rPr lang="en-US" dirty="0"/>
               <a:pPr/>
-              <a:t>12/7/2020</a:t>
+              <a:t>1/13/2021</a:t>
             </a:fld>
             <a:endParaRPr lang="en-US" dirty="0"/>
           </a:p>
@@ -3305,7 +3305,7 @@
             <a:fld id="{B61BEF0D-F0BB-DE4B-95CE-6DB70DBA9567}" type="datetimeFigureOut">
               <a:rPr lang="en-US" dirty="0"/>
               <a:pPr/>
-              <a:t>12/7/2020</a:t>
+              <a:t>1/13/2021</a:t>
             </a:fld>
             <a:endParaRPr lang="en-US" dirty="0"/>
           </a:p>
@@ -3643,7 +3643,7 @@
             <a:fld id="{B61BEF0D-F0BB-DE4B-95CE-6DB70DBA9567}" type="datetimeFigureOut">
               <a:rPr lang="en-US" dirty="0"/>
               <a:pPr/>
-              <a:t>12/7/2020</a:t>
+              <a:t>1/13/2021</a:t>
             </a:fld>
             <a:endParaRPr lang="en-US" dirty="0"/>
           </a:p>
@@ -3954,7 +3954,7 @@
             <a:fld id="{B61BEF0D-F0BB-DE4B-95CE-6DB70DBA9567}" type="datetimeFigureOut">
               <a:rPr lang="en-US" dirty="0"/>
               <a:pPr/>
-              <a:t>12/7/2020</a:t>
+              <a:t>1/13/2021</a:t>
             </a:fld>
             <a:endParaRPr lang="en-US" dirty="0"/>
           </a:p>
@@ -4344,7 +4344,7 @@
             <a:fld id="{B61BEF0D-F0BB-DE4B-95CE-6DB70DBA9567}" type="datetimeFigureOut">
               <a:rPr lang="en-US" dirty="0"/>
               <a:pPr/>
-              <a:t>12/7/2020</a:t>
+              <a:t>1/13/2021</a:t>
             </a:fld>
             <a:endParaRPr lang="en-US" dirty="0"/>
           </a:p>
@@ -4510,7 +4510,7 @@
           <a:p>
             <a:fld id="{55C6B4A9-1611-4792-9094-5F34BCA07E0B}" type="datetimeFigureOut">
               <a:rPr lang="en-US" dirty="0"/>
-              <a:t>12/7/2020</a:t>
+              <a:t>1/13/2021</a:t>
             </a:fld>
             <a:endParaRPr lang="en-US" dirty="0"/>
           </a:p>
@@ -4686,7 +4686,7 @@
             <a:fld id="{B61BEF0D-F0BB-DE4B-95CE-6DB70DBA9567}" type="datetimeFigureOut">
               <a:rPr lang="en-US" dirty="0"/>
               <a:pPr/>
-              <a:t>12/7/2020</a:t>
+              <a:t>1/13/2021</a:t>
             </a:fld>
             <a:endParaRPr lang="en-US" dirty="0"/>
           </a:p>
@@ -4859,7 +4859,7 @@
             <a:fld id="{B61BEF0D-F0BB-DE4B-95CE-6DB70DBA9567}" type="datetimeFigureOut">
               <a:rPr lang="en-US" dirty="0"/>
               <a:pPr/>
-              <a:t>12/7/2020</a:t>
+              <a:t>1/13/2021</a:t>
             </a:fld>
             <a:endParaRPr lang="en-US" dirty="0"/>
           </a:p>
@@ -5103,7 +5103,7 @@
             <a:fld id="{B61BEF0D-F0BB-DE4B-95CE-6DB70DBA9567}" type="datetimeFigureOut">
               <a:rPr lang="en-US" dirty="0"/>
               <a:pPr/>
-              <a:t>12/7/2020</a:t>
+              <a:t>1/13/2021</a:t>
             </a:fld>
             <a:endParaRPr lang="en-US" dirty="0"/>
           </a:p>
@@ -5331,7 +5331,7 @@
           <a:p>
             <a:fld id="{EB712588-04B1-427B-82EE-E8DB90309F08}" type="datetimeFigureOut">
               <a:rPr lang="en-US" dirty="0"/>
-              <a:t>12/7/2020</a:t>
+              <a:t>1/13/2021</a:t>
             </a:fld>
             <a:endParaRPr lang="en-US" dirty="0"/>
           </a:p>
@@ -5701,7 +5701,7 @@
             <a:fld id="{B61BEF0D-F0BB-DE4B-95CE-6DB70DBA9567}" type="datetimeFigureOut">
               <a:rPr lang="en-US" dirty="0"/>
               <a:pPr/>
-              <a:t>12/7/2020</a:t>
+              <a:t>1/13/2021</a:t>
             </a:fld>
             <a:endParaRPr lang="en-US" dirty="0"/>
           </a:p>
@@ -5821,7 +5821,7 @@
             <a:fld id="{B61BEF0D-F0BB-DE4B-95CE-6DB70DBA9567}" type="datetimeFigureOut">
               <a:rPr lang="en-US" dirty="0"/>
               <a:pPr/>
-              <a:t>12/7/2020</a:t>
+              <a:t>1/13/2021</a:t>
             </a:fld>
             <a:endParaRPr lang="en-US" dirty="0"/>
           </a:p>
@@ -5913,7 +5913,7 @@
             <a:fld id="{B61BEF0D-F0BB-DE4B-95CE-6DB70DBA9567}" type="datetimeFigureOut">
               <a:rPr lang="en-US" dirty="0"/>
               <a:pPr/>
-              <a:t>12/7/2020</a:t>
+              <a:t>1/13/2021</a:t>
             </a:fld>
             <a:endParaRPr lang="en-US" dirty="0"/>
           </a:p>
@@ -6164,7 +6164,7 @@
           <a:p>
             <a:fld id="{42A54C80-263E-416B-A8E0-580EDEADCBDC}" type="datetimeFigureOut">
               <a:rPr lang="en-US" dirty="0"/>
-              <a:t>12/7/2020</a:t>
+              <a:t>1/13/2021</a:t>
             </a:fld>
             <a:endParaRPr lang="en-US" dirty="0"/>
           </a:p>
@@ -6423,7 +6423,7 @@
             <a:fld id="{B61BEF0D-F0BB-DE4B-95CE-6DB70DBA9567}" type="datetimeFigureOut">
               <a:rPr lang="en-US" dirty="0"/>
               <a:pPr/>
-              <a:t>12/7/2020</a:t>
+              <a:t>1/13/2021</a:t>
             </a:fld>
             <a:endParaRPr lang="en-US" dirty="0"/>
           </a:p>
@@ -7163,7 +7163,7 @@
             <a:fld id="{B61BEF0D-F0BB-DE4B-95CE-6DB70DBA9567}" type="datetimeFigureOut">
               <a:rPr lang="en-US" dirty="0"/>
               <a:pPr/>
-              <a:t>12/7/2020</a:t>
+              <a:t>1/13/2021</a:t>
             </a:fld>
             <a:endParaRPr lang="en-US" dirty="0"/>
           </a:p>
@@ -9649,13 +9649,13 @@
         </p:nvSpPr>
         <p:spPr>
           <a:xfrm>
-            <a:off x="7147753" y="2124635"/>
-            <a:ext cx="4757376" cy="4338918"/>
+            <a:off x="7058828" y="2124635"/>
+            <a:ext cx="4914669" cy="4338918"/>
           </a:xfrm>
         </p:spPr>
         <p:txBody>
           <a:bodyPr anchor="t">
-            <a:normAutofit lnSpcReduction="10000"/>
+            <a:normAutofit/>
           </a:bodyPr>
           <a:lstStyle/>
           <a:p>
@@ -9685,7 +9685,7 @@
                   <a:srgbClr val="FFFFFF"/>
                 </a:solidFill>
               </a:rPr>
-              <a:t>The most efficient way is rarely portable; conversely increased portability </a:t>
+              <a:t>The most efficient way is rarely portable; increased portability almost always </a:t>
             </a:r>
             <a:r>
               <a:rPr lang="en-US" sz="2000" u="sng" dirty="0">
@@ -9746,7 +9746,7 @@
                   <a:srgbClr val="FFFFFF"/>
                 </a:solidFill>
               </a:rPr>
-              <a:t>This is also true of competing IaaS, PaaS and SaaS offerings.  Carefully rationalize couplings going in!</a:t>
+              <a:t>This is also true of competing IaaS, PaaS and SaaS offerings, so carefully rationalize couplings going in</a:t>
             </a:r>
           </a:p>
         </p:txBody>
@@ -10115,10 +10115,11 @@
             </a:r>
           </a:p>
           <a:p>
-            <a:pPr>
+            <a:pPr marL="0" indent="0">
               <a:lnSpc>
                 <a:spcPct val="90000"/>
               </a:lnSpc>
+              <a:buNone/>
             </a:pPr>
             <a:endParaRPr lang="en-US" dirty="0"/>
           </a:p>
@@ -10220,7 +10221,7 @@
         </p:spPr>
         <p:txBody>
           <a:bodyPr anchor="t">
-            <a:normAutofit lnSpcReduction="10000"/>
+            <a:normAutofit/>
           </a:bodyPr>
           <a:lstStyle/>
           <a:p>
@@ -10254,16 +10255,9 @@
             </a:r>
           </a:p>
           <a:p>
-            <a:r>
-              <a:rPr lang="en-US" sz="2800" dirty="0">
-                <a:solidFill>
-                  <a:schemeClr val="tx1"/>
-                </a:solidFill>
-              </a:rPr>
-              <a:t>Automate everything – DevOps, CI and CD, testing, documentation…</a:t>
-            </a:r>
-          </a:p>
-          <a:p>
+            <a:pPr marL="0" indent="0">
+              <a:buNone/>
+            </a:pPr>
             <a:endParaRPr lang="en-US" sz="2800" dirty="0">
               <a:solidFill>
                 <a:schemeClr val="tx1"/>
@@ -10662,13 +10656,13 @@
         </p:nvSpPr>
         <p:spPr>
           <a:xfrm>
-            <a:off x="4063160" y="2160589"/>
-            <a:ext cx="5207839" cy="3880773"/>
+            <a:off x="4063160" y="2159331"/>
+            <a:ext cx="5696137" cy="3882031"/>
           </a:xfrm>
         </p:spPr>
         <p:txBody>
           <a:bodyPr>
-            <a:normAutofit lnSpcReduction="10000"/>
+            <a:normAutofit fontScale="92500" lnSpcReduction="20000"/>
           </a:bodyPr>
           <a:lstStyle/>
           <a:p>
@@ -10686,8 +10680,21 @@
           <a:p>
             <a:r>
               <a:rPr lang="en-US" sz="2400" dirty="0"/>
-              <a:t>Perl’s and Python’s successes followed scripts because of this principle.  Puppet, Ansible, PowerShell and others are following a similar path</a:t>
-            </a:r>
+              <a:t>Perl’s and Python’s successes are in good part due to this principle.  Puppet, Ansible, PowerShell and others are following a similar path</a:t>
+            </a:r>
+          </a:p>
+          <a:p>
+            <a:r>
+              <a:rPr lang="en-US" sz="2400" dirty="0">
+                <a:solidFill>
+                  <a:schemeClr val="tx1"/>
+                </a:solidFill>
+              </a:rPr>
+              <a:t>While we’re at it - Automate everything – DevOps, CI and CD, testing, API documentation…</a:t>
+            </a:r>
+          </a:p>
+          <a:p>
+            <a:endParaRPr lang="en-US" sz="2400" dirty="0"/>
           </a:p>
         </p:txBody>
       </p:sp>
@@ -11050,7 +11057,7 @@
                   <a:srgbClr val="FFFFFF"/>
                 </a:solidFill>
               </a:rPr>
-              <a:t>Programs with CUIs are hard to combine with other programs</a:t>
+              <a:t>Programs with CUIs are hard to combine with other programs without delicate Robotic Process Automation screen scraping</a:t>
             </a:r>
           </a:p>
           <a:p>
@@ -11080,7 +11087,7 @@
                   <a:srgbClr val="FFFFFF"/>
                 </a:solidFill>
               </a:rPr>
-              <a:t>Lesson: Decouple your UIs and put the screen scraper down until last resort!</a:t>
+              <a:t>Lesson: Decouple your UIs and make integration easier</a:t>
             </a:r>
           </a:p>
         </p:txBody>
@@ -11312,7 +11319,39 @@
                   <a:schemeClr val="tx1"/>
                 </a:solidFill>
               </a:rPr>
-              <a:t>In UNIX, streams and pipes are magic</a:t>
+              <a:t>In UNIX, </a:t>
+            </a:r>
+            <a:r>
+              <a:rPr lang="en-US" sz="2400" u="sng" dirty="0">
+                <a:solidFill>
+                  <a:schemeClr val="tx1"/>
+                </a:solidFill>
+              </a:rPr>
+              <a:t>streams</a:t>
+            </a:r>
+            <a:r>
+              <a:rPr lang="en-US" sz="2400" dirty="0">
+                <a:solidFill>
+                  <a:schemeClr val="tx1"/>
+                </a:solidFill>
+              </a:rPr>
+              <a:t> and </a:t>
+            </a:r>
+            <a:r>
+              <a:rPr lang="en-US" sz="2400" u="sng" dirty="0">
+                <a:solidFill>
+                  <a:schemeClr val="tx1"/>
+                </a:solidFill>
+              </a:rPr>
+              <a:t>pipes</a:t>
+            </a:r>
+            <a:r>
+              <a:rPr lang="en-US" sz="2400" dirty="0">
+                <a:solidFill>
+                  <a:schemeClr val="tx1"/>
+                </a:solidFill>
+              </a:rPr>
+              <a:t> are magic</a:t>
             </a:r>
           </a:p>
           <a:p>
@@ -11773,7 +11812,7 @@
         </p:spPr>
         <p:txBody>
           <a:bodyPr>
-            <a:normAutofit lnSpcReduction="10000"/>
+            <a:normAutofit fontScale="92500" lnSpcReduction="10000"/>
           </a:bodyPr>
           <a:lstStyle/>
           <a:p>
@@ -11800,7 +11839,7 @@
             <a:pPr lvl="1"/>
             <a:r>
               <a:rPr lang="en-US" sz="2400" dirty="0"/>
-              <a:t>Cohesion and Decoupling get you very far – embrace them relentlessly!</a:t>
+              <a:t>The two concepts of Cohesion and Decoupling alone get you very far – embrace them relentlessly!</a:t>
             </a:r>
           </a:p>
           <a:p>
@@ -12333,7 +12372,7 @@
             </a:pPr>
             <a:r>
               <a:rPr lang="en-US" sz="2000" dirty="0"/>
-              <a:t>”So much of today is like yesterday”</a:t>
+              <a:t>”A lot of today is just like yesterday”</a:t>
             </a:r>
           </a:p>
           <a:p>
@@ -12527,13 +12566,13 @@
         </p:spPr>
         <p:txBody>
           <a:bodyPr>
-            <a:normAutofit fontScale="92500"/>
+            <a:normAutofit fontScale="92500" lnSpcReduction="20000"/>
           </a:bodyPr>
           <a:lstStyle/>
           <a:p>
             <a:r>
               <a:rPr lang="en-US" sz="2000" dirty="0"/>
-              <a:t>Early Unix developers evolved the concepts of modularity and reusability into software engineering, spawning a big "software tools" movement</a:t>
+              <a:t>Early midrange engineers tackled the concepts of distributed development, modularity and reusability, spawning a huge "software tools" movement</a:t>
             </a:r>
           </a:p>
           <a:p>
@@ -12547,7 +12586,7 @@
             </a:r>
             <a:r>
               <a:rPr lang="en-US" sz="2000" dirty="0"/>
-              <a:t>" in AT&amp;T Bell Laboratories’ Technical Journal, in which they argued the Unix philosophy of building small, focused programs that do only one thing but do this thing well, communicate via stdin/</a:t>
+              <a:t>" in AT&amp;T Bell Laboratories’ Technical Journal, in which they argued for the Unix philosophy of building small, focused programs that do only one thing but do this thing well, communicate via stdin/</a:t>
             </a:r>
             <a:r>
               <a:rPr lang="en-US" sz="2000" dirty="0" err="1"/>
@@ -12569,21 +12608,25 @@
             </a:r>
             <a:r>
               <a:rPr lang="en-US" sz="2000" dirty="0"/>
-              <a:t> followed it up in 1995 with </a:t>
+              <a:t> wrote </a:t>
             </a:r>
             <a:r>
               <a:rPr lang="en-US" sz="2000" b="1" dirty="0"/>
-              <a:t>“The UNIX Philosophy,” </a:t>
+              <a:t>“The UNIX Philosophy”</a:t>
             </a:r>
             <a:r>
               <a:rPr lang="en-US" sz="2000" dirty="0"/>
-              <a:t>emphasizing simple, short, clear, modular, and extensible code that’s easily maintained and repurposed by developers other than its creators </a:t>
-            </a:r>
-          </a:p>
-          <a:p>
+              <a:t> in 1995, underscoring simple, short, clear, modular, and extensible code that’s easily maintained and repurposed by developers other than its creators </a:t>
+            </a:r>
+          </a:p>
+          <a:p>
+            <a:r>
+              <a:rPr lang="en-US" sz="2000" b="1" dirty="0"/>
+              <a:t>The main theme here</a:t>
+            </a:r>
             <a:r>
               <a:rPr lang="en-US" sz="2000" dirty="0"/>
-              <a:t>Cohesion and Decoupling; Composability as opposed to monolithic design</a:t>
+              <a:t>: Cohesion and Decoupling - Composability as opposed to monolithic design</a:t>
             </a:r>
           </a:p>
           <a:p>
@@ -12593,7 +12636,7 @@
                   <a:srgbClr val="00B050"/>
                 </a:solidFill>
               </a:rPr>
-              <a:t>It still applies today – let’s discuss…!</a:t>
+              <a:t>These concepts still apply today – let’s discuss…!</a:t>
             </a:r>
           </a:p>
           <a:p>
@@ -12610,6 +12653,53 @@
           </a:p>
         </p:txBody>
       </p:sp>
+      <p:pic>
+        <p:nvPicPr>
+          <p:cNvPr id="1026" name="Picture 2" descr="Paperback The UNIX Philosophy Book">
+            <a:extLst>
+              <a:ext uri="{FF2B5EF4-FFF2-40B4-BE49-F238E27FC236}">
+                <a16:creationId xmlns:a16="http://schemas.microsoft.com/office/drawing/2014/main" id="{285CE364-FD4B-4EA8-A80F-759B2E103878}"/>
+              </a:ext>
+            </a:extLst>
+          </p:cNvPr>
+          <p:cNvPicPr>
+            <a:picLocks noChangeAspect="1" noChangeArrowheads="1"/>
+          </p:cNvPicPr>
+          <p:nvPr/>
+        </p:nvPicPr>
+        <p:blipFill>
+          <a:blip r:embed="rId3">
+            <a:extLst>
+              <a:ext uri="{28A0092B-C50C-407E-A947-70E740481C1C}">
+                <a14:useLocalDpi xmlns:a14="http://schemas.microsoft.com/office/drawing/2010/main" val="0"/>
+              </a:ext>
+            </a:extLst>
+          </a:blip>
+          <a:srcRect/>
+          <a:stretch>
+            <a:fillRect/>
+          </a:stretch>
+        </p:blipFill>
+        <p:spPr bwMode="auto">
+          <a:xfrm>
+            <a:off x="9530346" y="1864762"/>
+            <a:ext cx="2219325" cy="3333750"/>
+          </a:xfrm>
+          <a:prstGeom prst="rect">
+            <a:avLst/>
+          </a:prstGeom>
+          <a:noFill/>
+          <a:extLst>
+            <a:ext uri="{909E8E84-426E-40DD-AFC4-6F175D3DCCD1}">
+              <a14:hiddenFill xmlns:a14="http://schemas.microsoft.com/office/drawing/2010/main">
+                <a:solidFill>
+                  <a:srgbClr val="FFFFFF"/>
+                </a:solidFill>
+              </a14:hiddenFill>
+            </a:ext>
+          </a:extLst>
+        </p:spPr>
+      </p:pic>
     </p:spTree>
     <p:extLst>
       <p:ext uri="{BB962C8B-B14F-4D97-AF65-F5344CB8AC3E}">
@@ -12707,7 +12797,7 @@
         </p:spPr>
         <p:txBody>
           <a:bodyPr>
-            <a:normAutofit/>
+            <a:normAutofit fontScale="92500" lnSpcReduction="10000"/>
           </a:bodyPr>
           <a:lstStyle/>
           <a:p>
@@ -12718,7 +12808,7 @@
             </a:pPr>
             <a:r>
               <a:rPr lang="en-US" dirty="0"/>
-              <a:t>UNIX will go down as one of the most successful I.T. inventions ever.  As much as 70% of the Internet is composed of *nix</a:t>
+              <a:t>UNIX is one of the most successful I.T. inventions ever.  As much as 70% of the Internet is composed of *nix</a:t>
             </a:r>
           </a:p>
           <a:p>
@@ -12729,7 +12819,7 @@
             </a:pPr>
             <a:r>
               <a:rPr lang="en-US" dirty="0"/>
-              <a:t>Most people credit Ken Thompson of AT&amp;T with inventing the UNIX operating system, and in a sense they’re right – he wrote the first UNIX version in 1969 on a DEC PDP-7 minicomputer</a:t>
+              <a:t>Most people credit Ken Thompson of AT&amp;T with inventing the UNIX operating system, and in a sense they’re right – he wrote the first UNIX version in 1969 on a DEC PDP-7 minicomputer. </a:t>
             </a:r>
           </a:p>
           <a:p>
@@ -12740,15 +12830,31 @@
             </a:pPr>
             <a:r>
               <a:rPr lang="en-US" dirty="0"/>
-              <a:t>Thompson then rewrote it in 1972 from assembly language into B and later into Dennis Richie’s C for </a:t>
+              <a:t>He then rewrote it in 1972 from assembly language into B and later into Dennis Richie and Brian </a:t>
+            </a:r>
+            <a:r>
+              <a:rPr lang="en-US" dirty="0" err="1"/>
+              <a:t>Kerninghan’s</a:t>
+            </a:r>
+            <a:r>
+              <a:rPr lang="en-US" dirty="0"/>
+              <a:t> C for </a:t>
             </a:r>
             <a:r>
               <a:rPr lang="en-US" b="1" dirty="0"/>
               <a:t>portability</a:t>
             </a:r>
+            <a:endParaRPr lang="en-US" dirty="0"/>
+          </a:p>
+          <a:p>
+            <a:pPr>
+              <a:lnSpc>
+                <a:spcPct val="90000"/>
+              </a:lnSpc>
+            </a:pPr>
             <a:r>
               <a:rPr lang="en-US" dirty="0"/>
-              <a:t>, thus setting a precedent later extended by a cast of thousands including:</a:t>
+              <a:t>This set a precedent later extended by a cast of thousands including:</a:t>
             </a:r>
           </a:p>
           <a:p>
@@ -12759,15 +12865,15 @@
             </a:pPr>
             <a:r>
               <a:rPr lang="en-US" sz="1800" dirty="0"/>
-              <a:t>Alfred </a:t>
+              <a:t>Doug </a:t>
             </a:r>
             <a:r>
               <a:rPr lang="en-US" sz="1800" dirty="0" err="1"/>
-              <a:t>Aho</a:t>
+              <a:t>McIllroy</a:t>
             </a:r>
             <a:r>
               <a:rPr lang="en-US" sz="1800" dirty="0"/>
-              <a:t>: Pattern scanning, parsing, sorting</a:t>
+              <a:t>: Pipelines, spell, diff, sort, join, graph, tr</a:t>
             </a:r>
           </a:p>
           <a:p>
@@ -12778,8 +12884,21 @@
             </a:pPr>
             <a:r>
               <a:rPr lang="en-US" sz="1800" dirty="0"/>
-              <a:t>Eric Allman: Electronic mail</a:t>
-            </a:r>
+              <a:t>Joe </a:t>
+            </a:r>
+            <a:r>
+              <a:rPr lang="en-US" sz="1800" dirty="0" err="1"/>
+              <a:t>Ossanna</a:t>
+            </a:r>
+            <a:r>
+              <a:rPr lang="en-US" sz="1800" dirty="0"/>
+              <a:t>: Multics and </a:t>
+            </a:r>
+            <a:r>
+              <a:rPr lang="en-US" sz="1800" dirty="0" err="1"/>
+              <a:t>troff</a:t>
+            </a:r>
+            <a:endParaRPr lang="en-US" sz="1800" dirty="0"/>
           </a:p>
           <a:p>
             <a:pPr lvl="1">
@@ -12789,8 +12908,29 @@
             </a:pPr>
             <a:r>
               <a:rPr lang="en-US" sz="1800" dirty="0"/>
-              <a:t>Kenneth Arnold: Screen updating</a:t>
-            </a:r>
+              <a:t>Lorinda Cherry: Interactive calculator, </a:t>
+            </a:r>
+            <a:r>
+              <a:rPr lang="en-US" sz="1800" dirty="0" err="1"/>
+              <a:t>bc</a:t>
+            </a:r>
+            <a:r>
+              <a:rPr lang="en-US" sz="1800" dirty="0"/>
+              <a:t>, dc, </a:t>
+            </a:r>
+            <a:r>
+              <a:rPr lang="en-US" sz="1800" dirty="0" err="1"/>
+              <a:t>eqn</a:t>
+            </a:r>
+            <a:r>
+              <a:rPr lang="en-US" sz="1800" dirty="0"/>
+              <a:t>, </a:t>
+            </a:r>
+            <a:r>
+              <a:rPr lang="en-US" sz="1800" dirty="0" err="1"/>
+              <a:t>plotutils</a:t>
+            </a:r>
+            <a:endParaRPr lang="en-US" sz="1800" dirty="0"/>
           </a:p>
           <a:p>
             <a:pPr lvl="1">
@@ -12800,7 +12940,15 @@
             </a:pPr>
             <a:r>
               <a:rPr lang="en-US" sz="1800" dirty="0"/>
-              <a:t>Lorinda Cherry: Interactive calculator</a:t>
+              <a:t>Alfred </a:t>
+            </a:r>
+            <a:r>
+              <a:rPr lang="en-US" sz="1800" dirty="0" err="1"/>
+              <a:t>Aho</a:t>
+            </a:r>
+            <a:r>
+              <a:rPr lang="en-US" sz="1800" dirty="0"/>
+              <a:t>: Pattern scanning, parsing, sorting</a:t>
             </a:r>
           </a:p>
           <a:p>
@@ -12811,15 +12959,7 @@
             </a:pPr>
             <a:r>
               <a:rPr lang="en-US" sz="1800" dirty="0"/>
-              <a:t>Larry Wall: Patch utility, Perl command language, </a:t>
-            </a:r>
-            <a:r>
-              <a:rPr lang="en-US" sz="1800" dirty="0" err="1"/>
-              <a:t>rn</a:t>
-            </a:r>
-            <a:r>
-              <a:rPr lang="en-US" sz="1800" dirty="0"/>
-              <a:t> network news reader</a:t>
+              <a:t>Eric Allman: Electronic mail</a:t>
             </a:r>
           </a:p>
           <a:p>
@@ -12830,7 +12970,26 @@
             </a:pPr>
             <a:r>
               <a:rPr lang="en-US" sz="1800" dirty="0"/>
-              <a:t>And MANY, MANY more…</a:t>
+              <a:t>Larry Wall: Patch utility, Perl command language, </a:t>
+            </a:r>
+            <a:r>
+              <a:rPr lang="en-US" sz="1800" dirty="0" err="1"/>
+              <a:t>rn</a:t>
+            </a:r>
+            <a:r>
+              <a:rPr lang="en-US" sz="1800" dirty="0"/>
+              <a:t> network news reader</a:t>
+            </a:r>
+          </a:p>
+          <a:p>
+            <a:pPr lvl="1">
+              <a:lnSpc>
+                <a:spcPct val="90000"/>
+              </a:lnSpc>
+            </a:pPr>
+            <a:r>
+              <a:rPr lang="en-US" sz="1800" dirty="0"/>
+              <a:t>And MANY, MANY more following a shared design philosophy…</a:t>
             </a:r>
           </a:p>
         </p:txBody>
@@ -13249,17 +13408,33 @@
         </p:spPr>
         <p:txBody>
           <a:bodyPr anchor="ctr">
-            <a:normAutofit/>
+            <a:normAutofit fontScale="90000"/>
           </a:bodyPr>
           <a:lstStyle/>
           <a:p>
             <a:r>
-              <a:rPr lang="en-US" sz="3300">
+              <a:rPr lang="en-US" sz="3300" dirty="0">
                 <a:solidFill>
                   <a:schemeClr val="bg1"/>
                 </a:solidFill>
               </a:rPr>
-              <a:t>The UNIX Philosophy in a Nutshell</a:t>
+              <a:t>The UNIX Philosophy in a Nutshell (</a:t>
+            </a:r>
+            <a:r>
+              <a:rPr lang="en-US" sz="3300" dirty="0" err="1">
+                <a:solidFill>
+                  <a:schemeClr val="bg1"/>
+                </a:solidFill>
+              </a:rPr>
+              <a:t>Gancarz</a:t>
+            </a:r>
+            <a:r>
+              <a:rPr lang="en-US" sz="3300" dirty="0">
+                <a:solidFill>
+                  <a:schemeClr val="bg1"/>
+                </a:solidFill>
+              </a:rPr>
+              <a:t>)</a:t>
             </a:r>
           </a:p>
         </p:txBody>
@@ -13743,7 +13918,7 @@
             </a:pPr>
             <a:r>
               <a:rPr lang="en-US" dirty="0"/>
-              <a:t>Examples: Libraries, microservices, containers, data marts, server tiers and groupings, purpose-built VLAN segments, …</a:t>
+              <a:t>Examples: Libraries, microservices and containers</a:t>
             </a:r>
           </a:p>
           <a:p>
@@ -13754,7 +13929,26 @@
             </a:pPr>
             <a:r>
               <a:rPr lang="en-US" dirty="0"/>
-              <a:t>Avoid monoliths!</a:t>
+              <a:t>Also: Scoped </a:t>
+            </a:r>
+            <a:r>
+              <a:rPr lang="en-US" dirty="0" err="1"/>
+              <a:t>datamarts</a:t>
+            </a:r>
+            <a:r>
+              <a:rPr lang="en-US" dirty="0"/>
+              <a:t>, server tiers, purpose-built VLAN segments</a:t>
+            </a:r>
+          </a:p>
+          <a:p>
+            <a:pPr>
+              <a:lnSpc>
+                <a:spcPct val="90000"/>
+              </a:lnSpc>
+            </a:pPr>
+            <a:r>
+              <a:rPr lang="en-US" dirty="0"/>
+              <a:t>Avoid giant monoliths: Modularity is your friend</a:t>
             </a:r>
           </a:p>
           <a:p>
@@ -14063,7 +14257,7 @@
         </p:spPr>
         <p:txBody>
           <a:bodyPr>
-            <a:normAutofit/>
+            <a:normAutofit lnSpcReduction="10000"/>
           </a:bodyPr>
           <a:lstStyle/>
           <a:p>
@@ -14074,7 +14268,7 @@
             </a:pPr>
             <a:r>
               <a:rPr lang="en-US" sz="1700" dirty="0"/>
-              <a:t>The best program does one task in its life and does it well</a:t>
+              <a:t>Like #1, the best program does one task in its life and does it well</a:t>
             </a:r>
           </a:p>
           <a:p>
@@ -14085,7 +14279,7 @@
             </a:pPr>
             <a:r>
               <a:rPr lang="en-US" sz="1700" dirty="0"/>
-              <a:t>This is again true of OOP libraries, packages, classes, methods, build jobs, containers, ETL jobs, data schemas, deployment scripts and segmented infrastructure</a:t>
+              <a:t>This is again true of OOP’s libraries, packages, classes and methods, containers, ETL jobs, data schemas, deployment scripts and segmented infrastructure</a:t>
             </a:r>
           </a:p>
           <a:p>
@@ -14118,7 +14312,7 @@
             </a:pPr>
             <a:r>
               <a:rPr lang="en-US" sz="1700" dirty="0"/>
-              <a:t>Don’t be like “ls” and make assumptions about screen width and formatting (upward coupling)</a:t>
+              <a:t>Let’s talk for a moment about pipes…</a:t>
             </a:r>
           </a:p>
           <a:p>
@@ -14129,8 +14323,27 @@
             </a:pPr>
             <a:r>
               <a:rPr lang="en-US" sz="1700" dirty="0"/>
-              <a:t>Avoid monoliths (again)!</a:t>
-            </a:r>
+              <a:t>Don’t be like “ls” and make assumptions about screen width and formatting (upward coupling)</a:t>
+            </a:r>
+          </a:p>
+          <a:p>
+            <a:pPr>
+              <a:lnSpc>
+                <a:spcPct val="90000"/>
+              </a:lnSpc>
+            </a:pPr>
+            <a:r>
+              <a:rPr lang="en-US" sz="1600" dirty="0"/>
+              <a:t>Avoid giant monoliths (again!): Modularity is your friend</a:t>
+            </a:r>
+          </a:p>
+          <a:p>
+            <a:pPr>
+              <a:lnSpc>
+                <a:spcPct val="90000"/>
+              </a:lnSpc>
+            </a:pPr>
+            <a:endParaRPr lang="en-US" sz="1700" dirty="0"/>
           </a:p>
         </p:txBody>
       </p:sp>
@@ -14551,7 +14764,7 @@
         </p:nvSpPr>
         <p:spPr>
           <a:xfrm>
-            <a:off x="677334" y="2160589"/>
+            <a:off x="677334" y="1946939"/>
             <a:ext cx="9605184" cy="3880773"/>
           </a:xfrm>
         </p:spPr>
@@ -14626,7 +14839,7 @@
                   <a:srgbClr val="FFFFFF"/>
                 </a:solidFill>
               </a:rPr>
-              <a:t>Think about prototyping as a learning process</a:t>
+              <a:t>So, think about prototyping as a learning process</a:t>
             </a:r>
           </a:p>
           <a:p>
@@ -14694,6 +14907,17 @@
                 <a:sym typeface="Wingdings" panose="05000000000000000000" pitchFamily="2" charset="2"/>
               </a:rPr>
               <a:t></a:t>
+            </a:r>
+          </a:p>
+          <a:p>
+            <a:r>
+              <a:rPr lang="en-US" sz="2000" dirty="0">
+                <a:solidFill>
+                  <a:srgbClr val="FFFFFF"/>
+                </a:solidFill>
+                <a:sym typeface="Wingdings" panose="05000000000000000000" pitchFamily="2" charset="2"/>
+              </a:rPr>
+              <a:t>Sounds like Agile MVPs, doesn’t it?</a:t>
             </a:r>
           </a:p>
         </p:txBody>
@@ -15307,6 +15531,12 @@
 </file>
 
 <file path=customXml/item1.xml><?xml version="1.0" encoding="utf-8"?>
+<p:properties xmlns:p="http://schemas.microsoft.com/office/2006/metadata/properties" xmlns:xsi="http://www.w3.org/2001/XMLSchema-instance" xmlns:pc="http://schemas.microsoft.com/office/infopath/2007/PartnerControls">
+  <documentManagement/>
+</p:properties>
+</file>
+
+<file path=customXml/item2.xml><?xml version="1.0" encoding="utf-8"?>
 <ct:contentTypeSchema xmlns:ct="http://schemas.microsoft.com/office/2006/metadata/contentType" xmlns:ma="http://schemas.microsoft.com/office/2006/metadata/properties/metaAttributes" ct:_="" ma:_="" ma:contentTypeName="Document" ma:contentTypeID="0x010100999C4FC1E27B604AB083C5A2EF450DFC" ma:contentTypeVersion="0" ma:contentTypeDescription="Create a new document." ma:contentTypeScope="" ma:versionID="33e62442aba9e8183c430b9529e05696">
   <xsd:schema xmlns:xsd="http://www.w3.org/2001/XMLSchema" xmlns:xs="http://www.w3.org/2001/XMLSchema" xmlns:p="http://schemas.microsoft.com/office/2006/metadata/properties" targetNamespace="http://schemas.microsoft.com/office/2006/metadata/properties" ma:root="true" ma:fieldsID="1b05d82d297216baf5b26c55225140df">
     <xsd:element name="properties">
@@ -15420,12 +15650,6 @@
 </ct:contentTypeSchema>
 </file>
 
-<file path=customXml/item2.xml><?xml version="1.0" encoding="utf-8"?>
-<p:properties xmlns:p="http://schemas.microsoft.com/office/2006/metadata/properties" xmlns:xsi="http://www.w3.org/2001/XMLSchema-instance" xmlns:pc="http://schemas.microsoft.com/office/infopath/2007/PartnerControls">
-  <documentManagement/>
-</p:properties>
-</file>
-
 <file path=customXml/item3.xml><?xml version="1.0" encoding="utf-8"?>
 <?mso-contentType ?>
 <FormTemplates xmlns="http://schemas.microsoft.com/sharepoint/v3/contenttype/forms">
@@ -15436,6 +15660,21 @@
 </file>
 
 <file path=customXml/itemProps1.xml><?xml version="1.0" encoding="utf-8"?>
+<ds:datastoreItem xmlns:ds="http://schemas.openxmlformats.org/officeDocument/2006/customXml" ds:itemID="{1216D02C-A6EB-45B3-A6B2-3D1DF222F307}">
+  <ds:schemaRefs>
+    <ds:schemaRef ds:uri="http://schemas.microsoft.com/office/infopath/2007/PartnerControls"/>
+    <ds:schemaRef ds:uri="http://purl.org/dc/elements/1.1/"/>
+    <ds:schemaRef ds:uri="http://schemas.microsoft.com/office/2006/metadata/properties"/>
+    <ds:schemaRef ds:uri="http://schemas.microsoft.com/office/2006/documentManagement/types"/>
+    <ds:schemaRef ds:uri="http://purl.org/dc/terms/"/>
+    <ds:schemaRef ds:uri="http://schemas.openxmlformats.org/package/2006/metadata/core-properties"/>
+    <ds:schemaRef ds:uri="http://purl.org/dc/dcmitype/"/>
+    <ds:schemaRef ds:uri="http://www.w3.org/XML/1998/namespace"/>
+  </ds:schemaRefs>
+</ds:datastoreItem>
+</file>
+
+<file path=customXml/itemProps2.xml><?xml version="1.0" encoding="utf-8"?>
 <ds:datastoreItem xmlns:ds="http://schemas.openxmlformats.org/officeDocument/2006/customXml" ds:itemID="{A8ED9177-9849-439D-B4A9-EBD14F4EE18D}">
   <ds:schemaRefs>
     <ds:schemaRef ds:uri="http://schemas.microsoft.com/office/2006/metadata/contentType"/>
@@ -15451,21 +15690,6 @@
 </ds:datastoreItem>
 </file>
 
-<file path=customXml/itemProps2.xml><?xml version="1.0" encoding="utf-8"?>
-<ds:datastoreItem xmlns:ds="http://schemas.openxmlformats.org/officeDocument/2006/customXml" ds:itemID="{1216D02C-A6EB-45B3-A6B2-3D1DF222F307}">
-  <ds:schemaRefs>
-    <ds:schemaRef ds:uri="http://schemas.microsoft.com/office/infopath/2007/PartnerControls"/>
-    <ds:schemaRef ds:uri="http://purl.org/dc/elements/1.1/"/>
-    <ds:schemaRef ds:uri="http://schemas.microsoft.com/office/2006/metadata/properties"/>
-    <ds:schemaRef ds:uri="http://schemas.microsoft.com/office/2006/documentManagement/types"/>
-    <ds:schemaRef ds:uri="http://purl.org/dc/terms/"/>
-    <ds:schemaRef ds:uri="http://schemas.openxmlformats.org/package/2006/metadata/core-properties"/>
-    <ds:schemaRef ds:uri="http://purl.org/dc/dcmitype/"/>
-    <ds:schemaRef ds:uri="http://www.w3.org/XML/1998/namespace"/>
-  </ds:schemaRefs>
-</ds:datastoreItem>
-</file>
-
 <file path=customXml/itemProps3.xml><?xml version="1.0" encoding="utf-8"?>
 <ds:datastoreItem xmlns:ds="http://schemas.openxmlformats.org/officeDocument/2006/customXml" ds:itemID="{F218C08F-A677-43C3-BF8E-C9EC5ECE9826}">
   <ds:schemaRefs>

</xml_diff>